<commit_message>
change home oage title   ? GF#???
</commit_message>
<xml_diff>
--- a/source/pages/assets/images/source/DEQM Resource Diagram - VTE.pptx
+++ b/source/pages/assets/images/source/DEQM Resource Diagram - VTE.pptx
@@ -139,14 +139,6 @@
     </p:ext>
   </p:extLst>
 </p:presentation>
-</file>
-
-<file path=ppt/revisionInfo.xml><?xml version="1.0" encoding="utf-8"?>
-<p1510:revInfo xmlns:a="http://schemas.openxmlformats.org/drawingml/2006/main" xmlns:r="http://schemas.openxmlformats.org/officeDocument/2006/relationships" xmlns:p1510="http://schemas.microsoft.com/office/powerpoint/2015/10/main">
-  <p1510:revLst>
-    <p1510:client id="{FBE8AEE8-8215-834B-9AE6-5A78BB0D5C2F}" v="744" dt="2019-03-07T01:14:15.071"/>
-  </p1510:revLst>
-</p1510:revInfo>
 </file>
 
 <file path=ppt/notesMasters/notesMaster1.xml><?xml version="1.0" encoding="utf-8"?>
@@ -7256,7 +7248,7 @@
           <a:p>
             <a:pPr algn="l"/>
             <a:r>
-              <a:rPr lang="en-US" sz="2800"/>
+              <a:rPr lang="en-US" sz="2800" dirty="0"/>
               <a:t>Option 6</a:t>
             </a:r>
             <a:br>
@@ -9346,15 +9338,7 @@
             </a:pPr>
             <a:r>
               <a:rPr lang="en-US" sz="2800" dirty="0"/>
-              <a:t>When a patient has an inpatient encounter, during which they should be given VTE prophylaxis, but they are not given said prophylaxis, the patient’s record must document a reason the medication/device was not provided. This reason must be coded, and must come from either the “medical reason” or “patient refusal” value sets, as stated </a:t>
-            </a:r>
-            <a:r>
-              <a:rPr lang="en-US" sz="2800"/>
-              <a:t>in the measure logic. </a:t>
-            </a:r>
-            <a:r>
-              <a:rPr lang="en-US" sz="2800" dirty="0"/>
-              <a:t>If these criteria are met, the patient will have been found to satisfy the requirements of the measure.</a:t>
+              <a:t>When a patient has an inpatient encounter, during which they should be given VTE prophylaxis, but they are not given said prophylaxis, the patient’s record must document a reason the medication/device was not provided. This reason must be coded, and must come from either the “medical reason” or “patient refusal” value sets, as stated in the measure logic. If these criteria are met, the patient will have been found to satisfy the requirements of the measure.</a:t>
             </a:r>
           </a:p>
         </p:txBody>

</xml_diff>